<commit_message>
add stable-optimal.pptx, copyleft 6042F15welcome.pptx
</commit_message>
<xml_diff>
--- a/fall15/slidesF15/6042F15welcome.pptx
+++ b/fall15/slidesF15/6042F15welcome.pptx
@@ -4308,13 +4308,7 @@
               <a:rPr lang="en-US" sz="1000" dirty="0" smtClean="0">
                 <a:latin typeface="Comic Sans MS" pitchFamily="66" charset="0"/>
               </a:rPr>
-              <a:t>  </a:t>
-            </a:r>
-            <a:r>
-              <a:rPr lang="en-US" sz="1000" dirty="0" smtClean="0">
-                <a:latin typeface="Comic Sans MS" pitchFamily="66" charset="0"/>
-              </a:rPr>
-              <a:t>2015</a:t>
+              <a:t>  2015</a:t>
             </a:r>
             <a:endParaRPr lang="en-US" sz="1000" dirty="0">
               <a:latin typeface="Comic Sans MS" pitchFamily="66" charset="0"/>
@@ -4382,22 +4376,22 @@
       </p:sp>
       <p:pic>
         <p:nvPicPr>
-          <p:cNvPr id="8" name="Picture 7" descr="license.img"/>
+          <p:cNvPr id="9" name="Picture 8"/>
           <p:cNvPicPr>
-            <a:picLocks/>
+            <a:picLocks noChangeAspect="1"/>
           </p:cNvPicPr>
           <p:nvPr userDrawn="1"/>
         </p:nvPicPr>
         <p:blipFill>
-          <a:blip r:embed="rId13" cstate="print"/>
+          <a:blip r:embed="rId13"/>
           <a:stretch>
             <a:fillRect/>
           </a:stretch>
         </p:blipFill>
         <p:spPr>
           <a:xfrm>
-            <a:off x="76200" y="6506496"/>
-            <a:ext cx="990600" cy="304800"/>
+            <a:off x="0" y="6500090"/>
+            <a:ext cx="1016000" cy="357909"/>
           </a:xfrm>
           <a:prstGeom prst="rect">
             <a:avLst/>
@@ -4949,15 +4943,7 @@
             </a:pPr>
             <a:r>
               <a:rPr lang="en-US" sz="6000" b="1" dirty="0" smtClean="0"/>
-              <a:t>Prof</a:t>
-            </a:r>
-            <a:r>
-              <a:rPr lang="en-US" sz="6000" b="1" dirty="0" smtClean="0"/>
-              <a:t>. Albert R </a:t>
-            </a:r>
-            <a:r>
-              <a:rPr lang="en-US" sz="6000" b="1" dirty="0" smtClean="0"/>
-              <a:t>Meyer*</a:t>
+              <a:t>Prof. Albert R Meyer*</a:t>
             </a:r>
           </a:p>
           <a:p>
@@ -5000,7 +4986,7 @@
           <a:graphicData uri="http://schemas.openxmlformats.org/presentationml/2006/ole">
             <mc:AlternateContent xmlns:mc="http://schemas.openxmlformats.org/markup-compatibility/2006">
               <mc:Choice xmlns:v="urn:schemas-microsoft-com:vml" Requires="v">
-                <p:oleObj spid="_x0000_s1233" name="Equation" r:id="rId4" imgW="914400" imgH="215640" progId="Equation.3">
+                <p:oleObj spid="_x0000_s1236" name="Equation" r:id="rId4" imgW="914400" imgH="215640" progId="Equation.3">
                   <p:embed/>
                 </p:oleObj>
               </mc:Choice>
@@ -5070,7 +5056,7 @@
           <a:graphicData uri="http://schemas.openxmlformats.org/presentationml/2006/ole">
             <mc:AlternateContent xmlns:mc="http://schemas.openxmlformats.org/markup-compatibility/2006">
               <mc:Choice xmlns:v="urn:schemas-microsoft-com:vml" Requires="v">
-                <p:oleObj spid="_x0000_s1234" name="Equation" r:id="rId6" imgW="914400" imgH="215640" progId="Equation.3">
+                <p:oleObj spid="_x0000_s1237" name="Equation" r:id="rId6" imgW="914400" imgH="215640" progId="Equation.3">
                   <p:embed/>
                 </p:oleObj>
               </mc:Choice>
@@ -6149,7 +6135,6 @@
               <a:rPr lang="en-US" sz="4000" dirty="0" smtClean="0"/>
               <a:t> for credit</a:t>
             </a:r>
-            <a:endParaRPr lang="en-US" sz="4000" dirty="0" smtClean="0"/>
           </a:p>
           <a:p>
             <a:r>
@@ -6207,17 +6192,8 @@
             </a:pPr>
             <a:r>
               <a:rPr lang="en-US" sz="4000" dirty="0" smtClean="0"/>
-              <a:t>      two 60 min., two 90 </a:t>
-            </a:r>
-            <a:r>
-              <a:rPr lang="en-US" sz="4000" dirty="0" smtClean="0"/>
-              <a:t>min</a:t>
-            </a:r>
-            <a:r>
-              <a:rPr lang="en-US" sz="4000" dirty="0" smtClean="0"/>
-              <a:t>.</a:t>
-            </a:r>
-            <a:endParaRPr lang="en-US" sz="4000" dirty="0" smtClean="0"/>
+              <a:t>      two 60 min., two 90 min.</a:t>
+            </a:r>
           </a:p>
           <a:p>
             <a:r>
@@ -8123,34 +8099,7 @@
                 </a:solidFill>
                 <a:latin typeface="Comic Sans MS" pitchFamily="66" charset="0"/>
               </a:rPr>
-              <a:t>(</a:t>
-            </a:r>
-            <a:r>
-              <a:rPr lang="en-US" sz="6000" dirty="0" smtClean="0">
-                <a:solidFill>
-                  <a:srgbClr val="0D05A7"/>
-                </a:solidFill>
-                <a:latin typeface="Comic Sans MS" pitchFamily="66" charset="0"/>
-              </a:rPr>
-              <a:t>your </a:t>
-            </a:r>
-            <a:r>
-              <a:rPr lang="en-US" sz="6000" dirty="0" smtClean="0">
-                <a:solidFill>
-                  <a:srgbClr val="0D05A7"/>
-                </a:solidFill>
-                <a:latin typeface="Comic Sans MS" pitchFamily="66" charset="0"/>
-              </a:rPr>
-              <a:t>instructors </a:t>
-            </a:r>
-            <a:r>
-              <a:rPr lang="en-US" sz="6000" dirty="0" smtClean="0">
-                <a:solidFill>
-                  <a:srgbClr val="0D05A7"/>
-                </a:solidFill>
-                <a:latin typeface="Comic Sans MS" pitchFamily="66" charset="0"/>
-              </a:rPr>
-              <a:t>too)</a:t>
+              <a:t>(your instructors too)</a:t>
             </a:r>
           </a:p>
         </p:txBody>
@@ -8375,7 +8324,7 @@
           <a:graphicData uri="http://schemas.openxmlformats.org/presentationml/2006/ole">
             <mc:AlternateContent xmlns:mc="http://schemas.openxmlformats.org/markup-compatibility/2006">
               <mc:Choice xmlns:v="urn:schemas-microsoft-com:vml" Requires="v">
-                <p:oleObj spid="_x0000_s219182" name="Equation" r:id="rId4" imgW="914400" imgH="215640" progId="Equation.3">
+                <p:oleObj spid="_x0000_s219185" name="Equation" r:id="rId4" imgW="914400" imgH="215640" progId="Equation.3">
                   <p:embed/>
                 </p:oleObj>
               </mc:Choice>
@@ -8445,7 +8394,7 @@
           <a:graphicData uri="http://schemas.openxmlformats.org/presentationml/2006/ole">
             <mc:AlternateContent xmlns:mc="http://schemas.openxmlformats.org/markup-compatibility/2006">
               <mc:Choice xmlns:v="urn:schemas-microsoft-com:vml" Requires="v">
-                <p:oleObj spid="_x0000_s219183" name="Equation" r:id="rId6" imgW="914400" imgH="215640" progId="Equation.3">
+                <p:oleObj spid="_x0000_s219186" name="Equation" r:id="rId6" imgW="914400" imgH="215640" progId="Equation.3">
                   <p:embed/>
                 </p:oleObj>
               </mc:Choice>
@@ -8811,15 +8760,7 @@
                   <a:srgbClr val="0D05A7"/>
                 </a:solidFill>
               </a:rPr>
-              <a:t>*</a:t>
-            </a:r>
-            <a:r>
-              <a:rPr lang="en-US" sz="6000" dirty="0" smtClean="0">
-                <a:solidFill>
-                  <a:srgbClr val="0D05A7"/>
-                </a:solidFill>
-              </a:rPr>
-              <a:t>me</a:t>
+              <a:t>*me</a:t>
             </a:r>
             <a:endParaRPr lang="en-US" b="1" u="sng" dirty="0">
               <a:latin typeface="Courier New" pitchFamily="49" charset="0"/>
@@ -8844,7 +8785,7 @@
           <a:graphicData uri="http://schemas.openxmlformats.org/presentationml/2006/ole">
             <mc:AlternateContent xmlns:mc="http://schemas.openxmlformats.org/markup-compatibility/2006">
               <mc:Choice xmlns:v="urn:schemas-microsoft-com:vml" Requires="v">
-                <p:oleObj spid="_x0000_s218164" name="Equation" r:id="rId4" imgW="914400" imgH="215640" progId="Equation.3">
+                <p:oleObj spid="_x0000_s218167" name="Equation" r:id="rId4" imgW="914400" imgH="215640" progId="Equation.3">
                   <p:embed/>
                 </p:oleObj>
               </mc:Choice>
@@ -8914,7 +8855,7 @@
           <a:graphicData uri="http://schemas.openxmlformats.org/presentationml/2006/ole">
             <mc:AlternateContent xmlns:mc="http://schemas.openxmlformats.org/markup-compatibility/2006">
               <mc:Choice xmlns:v="urn:schemas-microsoft-com:vml" Requires="v">
-                <p:oleObj spid="_x0000_s218165" name="Equation" r:id="rId6" imgW="914400" imgH="215640" progId="Equation.3">
+                <p:oleObj spid="_x0000_s218168" name="Equation" r:id="rId6" imgW="914400" imgH="215640" progId="Equation.3">
                   <p:embed/>
                 </p:oleObj>
               </mc:Choice>
@@ -9225,11 +9166,7 @@
             <a:pPr eaLnBrk="1" hangingPunct="1"/>
             <a:r>
               <a:rPr lang="en-US" dirty="0" smtClean="0"/>
-              <a:t>6.042 Quick </a:t>
-            </a:r>
-            <a:r>
-              <a:rPr lang="en-US" dirty="0" smtClean="0"/>
-              <a:t>Summary</a:t>
+              <a:t>6.042 Quick Summary</a:t>
             </a:r>
           </a:p>
         </p:txBody>
@@ -9932,7 +9869,7 @@
           <a:graphicData uri="http://schemas.openxmlformats.org/presentationml/2006/ole">
             <mc:AlternateContent xmlns:mc="http://schemas.openxmlformats.org/markup-compatibility/2006">
               <mc:Choice xmlns:v="urn:schemas-microsoft-com:vml" Requires="v">
-                <p:oleObj spid="_x0000_s140504" name="Equation" r:id="rId4" imgW="914400" imgH="215640" progId="Equation.3">
+                <p:oleObj spid="_x0000_s140507" name="Equation" r:id="rId4" imgW="914400" imgH="215640" progId="Equation.3">
                   <p:embed/>
                 </p:oleObj>
               </mc:Choice>
@@ -10002,7 +9939,7 @@
           <a:graphicData uri="http://schemas.openxmlformats.org/presentationml/2006/ole">
             <mc:AlternateContent xmlns:mc="http://schemas.openxmlformats.org/markup-compatibility/2006">
               <mc:Choice xmlns:v="urn:schemas-microsoft-com:vml" Requires="v">
-                <p:oleObj spid="_x0000_s140505" name="Equation" r:id="rId6" imgW="914400" imgH="215640" progId="Equation.3">
+                <p:oleObj spid="_x0000_s140508" name="Equation" r:id="rId6" imgW="914400" imgH="215640" progId="Equation.3">
                   <p:embed/>
                 </p:oleObj>
               </mc:Choice>
@@ -10285,29 +10222,7 @@
                 <a:cs typeface="Courier New" pitchFamily="49" charset="0"/>
                 <a:hlinkClick r:id="rId7"/>
               </a:rPr>
-              <a:t>/</a:t>
-            </a:r>
-            <a:r>
-              <a:rPr lang="en-US" sz="2400" b="1" u="sng" kern="0" dirty="0" smtClean="0">
-                <a:solidFill>
-                  <a:srgbClr val="A0106D"/>
-                </a:solidFill>
-                <a:latin typeface="Courier New" pitchFamily="49" charset="0"/>
-                <a:cs typeface="Courier New" pitchFamily="49" charset="0"/>
-                <a:hlinkClick r:id="rId7"/>
-              </a:rPr>
-              <a:t>fa</a:t>
-            </a:r>
-            <a:r>
-              <a:rPr lang="en-US" sz="2400" b="1" u="sng" kern="0" dirty="0" smtClean="0">
-                <a:solidFill>
-                  <a:srgbClr val="A0106D"/>
-                </a:solidFill>
-                <a:latin typeface="Courier New" pitchFamily="49" charset="0"/>
-                <a:cs typeface="Courier New" pitchFamily="49" charset="0"/>
-                <a:hlinkClick r:id="rId7"/>
-              </a:rPr>
-              <a:t>15</a:t>
+              <a:t>/fa15</a:t>
             </a:r>
             <a:r>
               <a:rPr lang="en-US" sz="2400" b="1" u="sng" kern="0" dirty="0">
@@ -10993,7 +10908,7 @@
           <a:graphicData uri="http://schemas.openxmlformats.org/presentationml/2006/ole">
             <mc:AlternateContent xmlns:mc="http://schemas.openxmlformats.org/markup-compatibility/2006">
               <mc:Choice xmlns:v="urn:schemas-microsoft-com:vml" Requires="v">
-                <p:oleObj spid="_x0000_s2277" name="Equation" r:id="rId4" imgW="914400" imgH="215640" progId="Equation.3">
+                <p:oleObj spid="_x0000_s2280" name="Equation" r:id="rId4" imgW="914400" imgH="215640" progId="Equation.3">
                   <p:embed/>
                 </p:oleObj>
               </mc:Choice>
@@ -11063,7 +10978,7 @@
           <a:graphicData uri="http://schemas.openxmlformats.org/presentationml/2006/ole">
             <mc:AlternateContent xmlns:mc="http://schemas.openxmlformats.org/markup-compatibility/2006">
               <mc:Choice xmlns:v="urn:schemas-microsoft-com:vml" Requires="v">
-                <p:oleObj spid="_x0000_s2278" name="Equation" r:id="rId6" imgW="914400" imgH="215640" progId="Equation.3">
+                <p:oleObj spid="_x0000_s2281" name="Equation" r:id="rId6" imgW="914400" imgH="215640" progId="Equation.3">
                   <p:embed/>
                 </p:oleObj>
               </mc:Choice>
@@ -12168,7 +12083,7 @@
           <a:graphicData uri="http://schemas.openxmlformats.org/presentationml/2006/ole">
             <mc:AlternateContent xmlns:mc="http://schemas.openxmlformats.org/markup-compatibility/2006">
               <mc:Choice xmlns:v="urn:schemas-microsoft-com:vml" Requires="v">
-                <p:oleObj spid="_x0000_s3249" name="Equation" r:id="rId4" imgW="914400" imgH="215640" progId="Equation.3">
+                <p:oleObj spid="_x0000_s3251" name="Equation" r:id="rId4" imgW="914400" imgH="215640" progId="Equation.3">
                   <p:embed/>
                 </p:oleObj>
               </mc:Choice>

</xml_diff>